<commit_message>
Updated Wine Data presentation
</commit_message>
<xml_diff>
--- a/Wine_Data.pptx
+++ b/Wine_Data.pptx
@@ -4307,7 +4307,7 @@
         </p:blipFill>
         <p:spPr>
           <a:xfrm>
-            <a:off x="1652262" y="2397112"/>
+            <a:off x="1665325" y="2423238"/>
             <a:ext cx="3161980" cy="3258162"/>
           </a:xfrm>
           <a:prstGeom prst="rect">
@@ -4786,7 +4786,7 @@
             <a:picLocks noGrp="1" noChangeAspect="1"/>
           </p:cNvPicPr>
           <p:nvPr>
-            <p:ph idx="1"/>
+            <p:ph idx="4294967295"/>
           </p:nvPr>
         </p:nvPicPr>
         <p:blipFill>
@@ -4797,8 +4797,8 @@
         </p:blipFill>
         <p:spPr>
           <a:xfrm>
-            <a:off x="4111420" y="1853754"/>
-            <a:ext cx="5293837" cy="4156319"/>
+            <a:off x="6897688" y="1854200"/>
+            <a:ext cx="5294312" cy="4156075"/>
           </a:xfrm>
           <a:prstGeom prst="rect">
             <a:avLst/>
@@ -4876,6 +4876,136 @@
               <a:t> to retrieve zip codes</a:t>
             </a:r>
             <a:endParaRPr lang="en-US" sz="1600" dirty="0"/>
+          </a:p>
+        </p:txBody>
+      </p:sp>
+      <p:sp>
+        <p:nvSpPr>
+          <p:cNvPr id="9" name="TextBox 8"/>
+          <p:cNvSpPr txBox="1"/>
+          <p:nvPr/>
+        </p:nvSpPr>
+        <p:spPr>
+          <a:xfrm>
+            <a:off x="1534696" y="2087811"/>
+            <a:ext cx="5068389" cy="3970318"/>
+          </a:xfrm>
+          <a:prstGeom prst="rect">
+            <a:avLst/>
+          </a:prstGeom>
+          <a:noFill/>
+        </p:spPr>
+        <p:txBody>
+          <a:bodyPr wrap="square" rtlCol="0">
+            <a:spAutoFit/>
+          </a:bodyPr>
+          <a:lstStyle/>
+          <a:p>
+            <a:r>
+              <a:rPr lang="en-US" dirty="0" smtClean="0"/>
+              <a:t>Australia</a:t>
+            </a:r>
+            <a:r>
+              <a:rPr lang="en-US" dirty="0"/>
+              <a:t>: 225, 135, </a:t>
+            </a:r>
+            <a:r>
+              <a:rPr lang="en-US" dirty="0" smtClean="0"/>
+              <a:t>112</a:t>
+            </a:r>
+          </a:p>
+          <a:p>
+            <a:r>
+              <a:rPr lang="en-US" dirty="0"/>
+              <a:t>Canada: 95, 87.5, </a:t>
+            </a:r>
+            <a:r>
+              <a:rPr lang="en-US" dirty="0" smtClean="0"/>
+              <a:t>80</a:t>
+            </a:r>
+          </a:p>
+          <a:p>
+            <a:r>
+              <a:rPr lang="en-US" dirty="0" smtClean="0"/>
+              <a:t>France</a:t>
+            </a:r>
+            <a:r>
+              <a:rPr lang="en-US" dirty="0"/>
+              <a:t>: 3500, 1562.5, 580</a:t>
+            </a:r>
+          </a:p>
+          <a:p>
+            <a:r>
+              <a:rPr lang="en-US" dirty="0"/>
+              <a:t>Italy: 587, 450, </a:t>
+            </a:r>
+            <a:r>
+              <a:rPr lang="en-US" dirty="0" smtClean="0"/>
+              <a:t>254.5</a:t>
+            </a:r>
+          </a:p>
+          <a:p>
+            <a:r>
+              <a:rPr lang="en-US" dirty="0"/>
+              <a:t>Spain: 160, 130, </a:t>
+            </a:r>
+            <a:r>
+              <a:rPr lang="en-US" dirty="0" smtClean="0"/>
+              <a:t>120</a:t>
+            </a:r>
+            <a:endParaRPr lang="en-US" dirty="0"/>
+          </a:p>
+          <a:p>
+            <a:r>
+              <a:rPr lang="en-US" dirty="0"/>
+              <a:t>US: 387, 275, 250</a:t>
+            </a:r>
+          </a:p>
+          <a:p>
+            <a:endParaRPr lang="en-US" dirty="0" smtClean="0"/>
+          </a:p>
+          <a:p>
+            <a:r>
+              <a:rPr lang="en-US" u="sng" dirty="0" smtClean="0"/>
+              <a:t>Rank:</a:t>
+            </a:r>
+          </a:p>
+          <a:p>
+            <a:r>
+              <a:rPr lang="en-US" dirty="0" smtClean="0"/>
+              <a:t>France</a:t>
+            </a:r>
+          </a:p>
+          <a:p>
+            <a:r>
+              <a:rPr lang="en-US" dirty="0" smtClean="0"/>
+              <a:t>Italy</a:t>
+            </a:r>
+          </a:p>
+          <a:p>
+            <a:r>
+              <a:rPr lang="en-US" dirty="0" smtClean="0"/>
+              <a:t>US</a:t>
+            </a:r>
+          </a:p>
+          <a:p>
+            <a:r>
+              <a:rPr lang="en-US" dirty="0" smtClean="0"/>
+              <a:t>Australia</a:t>
+            </a:r>
+          </a:p>
+          <a:p>
+            <a:r>
+              <a:rPr lang="en-US" dirty="0" smtClean="0"/>
+              <a:t>Spain</a:t>
+            </a:r>
+          </a:p>
+          <a:p>
+            <a:r>
+              <a:rPr lang="en-US" dirty="0" smtClean="0"/>
+              <a:t>Canada</a:t>
+            </a:r>
+            <a:endParaRPr lang="en-US" dirty="0"/>
           </a:p>
         </p:txBody>
       </p:sp>
@@ -4932,15 +5062,87 @@
           </a:p>
         </p:txBody>
       </p:sp>
+      <p:sp>
+        <p:nvSpPr>
+          <p:cNvPr id="5" name="TextBox 4"/>
+          <p:cNvSpPr txBox="1"/>
+          <p:nvPr/>
+        </p:nvSpPr>
+        <p:spPr>
+          <a:xfrm>
+            <a:off x="277490" y="6058129"/>
+            <a:ext cx="9349835" cy="861774"/>
+          </a:xfrm>
+          <a:prstGeom prst="rect">
+            <a:avLst/>
+          </a:prstGeom>
+          <a:noFill/>
+        </p:spPr>
+        <p:txBody>
+          <a:bodyPr wrap="square" rtlCol="0">
+            <a:spAutoFit/>
+          </a:bodyPr>
+          <a:lstStyle/>
+          <a:p>
+            <a:r>
+              <a:rPr lang="en-US" sz="1600" dirty="0" smtClean="0"/>
+              <a:t>Source: Pulled 2/23/29 - https</a:t>
+            </a:r>
+            <a:r>
+              <a:rPr lang="en-US" sz="1600" dirty="0"/>
+              <a:t>://</a:t>
+            </a:r>
+            <a:r>
+              <a:rPr lang="en-US" sz="1600" dirty="0" smtClean="0"/>
+              <a:t>www.kaggle.com/zynicide/wine-reviews</a:t>
+            </a:r>
+          </a:p>
+          <a:p>
+            <a:r>
+              <a:rPr lang="en-US" sz="1600" dirty="0" smtClean="0"/>
+              <a:t>Source</a:t>
+            </a:r>
+            <a:r>
+              <a:rPr lang="en-US" sz="1600" dirty="0"/>
+              <a:t>: Scraped June 17, 2017 </a:t>
+            </a:r>
+            <a:r>
+              <a:rPr lang="en-US" sz="1600" dirty="0" smtClean="0"/>
+              <a:t>- https</a:t>
+            </a:r>
+            <a:r>
+              <a:rPr lang="en-US" sz="1600" dirty="0"/>
+              <a:t>://www.winemag.com/?s=&amp;</a:t>
+            </a:r>
+            <a:r>
+              <a:rPr lang="en-US" sz="1600" dirty="0" smtClean="0"/>
+              <a:t>drink_type=wine</a:t>
+            </a:r>
+          </a:p>
+          <a:p>
+            <a:r>
+              <a:rPr lang="en-US" sz="1600" dirty="0" smtClean="0"/>
+              <a:t>Source: Google API –Long/</a:t>
+            </a:r>
+            <a:r>
+              <a:rPr lang="en-US" sz="1600" dirty="0" err="1" smtClean="0"/>
+              <a:t>Lat</a:t>
+            </a:r>
+            <a:r>
+              <a:rPr lang="en-US" sz="1600" dirty="0" smtClean="0"/>
+              <a:t> to retrieve zip codes</a:t>
+            </a:r>
+            <a:endParaRPr lang="en-US" sz="1600" dirty="0"/>
+          </a:p>
+        </p:txBody>
+      </p:sp>
       <p:pic>
         <p:nvPicPr>
-          <p:cNvPr id="4" name="Content Placeholder 3"/>
+          <p:cNvPr id="6" name="Picture 5"/>
           <p:cNvPicPr>
-            <a:picLocks noGrp="1" noChangeAspect="1"/>
+            <a:picLocks noChangeAspect="1"/>
           </p:cNvPicPr>
-          <p:nvPr>
-            <p:ph idx="1"/>
-          </p:nvPr>
+          <p:nvPr/>
         </p:nvPicPr>
         <p:blipFill>
           <a:blip r:embed="rId2"/>
@@ -4950,8 +5152,8 @@
         </p:blipFill>
         <p:spPr>
           <a:xfrm>
-            <a:off x="3974628" y="1853754"/>
-            <a:ext cx="5589328" cy="4155160"/>
+            <a:off x="6428204" y="1853754"/>
+            <a:ext cx="5502538" cy="4204375"/>
           </a:xfrm>
           <a:prstGeom prst="rect">
             <a:avLst/>
@@ -4960,14 +5162,14 @@
       </p:pic>
       <p:sp>
         <p:nvSpPr>
-          <p:cNvPr id="5" name="TextBox 4"/>
+          <p:cNvPr id="9" name="TextBox 8"/>
           <p:cNvSpPr txBox="1"/>
           <p:nvPr/>
         </p:nvSpPr>
         <p:spPr>
           <a:xfrm>
-            <a:off x="277490" y="6058129"/>
-            <a:ext cx="9349835" cy="861774"/>
+            <a:off x="1226386" y="1998617"/>
+            <a:ext cx="5068389" cy="3416320"/>
           </a:xfrm>
           <a:prstGeom prst="rect">
             <a:avLst/>
@@ -4981,54 +5183,69 @@
           <a:lstStyle/>
           <a:p>
             <a:r>
-              <a:rPr lang="en-US" sz="1600" dirty="0" smtClean="0"/>
-              <a:t>Source: Pulled 2/23/29 - https</a:t>
-            </a:r>
-            <a:r>
-              <a:rPr lang="en-US" sz="1600" dirty="0"/>
-              <a:t>://</a:t>
-            </a:r>
-            <a:r>
-              <a:rPr lang="en-US" sz="1600" dirty="0" smtClean="0"/>
-              <a:t>www.kaggle.com/zynicide/wine-reviews</a:t>
-            </a:r>
-          </a:p>
-          <a:p>
-            <a:r>
-              <a:rPr lang="en-US" sz="1600" dirty="0" smtClean="0"/>
-              <a:t>Source</a:t>
-            </a:r>
-            <a:r>
-              <a:rPr lang="en-US" sz="1600" dirty="0"/>
-              <a:t>: Scraped June 17, 2017 </a:t>
-            </a:r>
-            <a:r>
-              <a:rPr lang="en-US" sz="1600" dirty="0" smtClean="0"/>
-              <a:t>- https</a:t>
-            </a:r>
-            <a:r>
-              <a:rPr lang="en-US" sz="1600" dirty="0"/>
-              <a:t>://www.winemag.com/?s=&amp;</a:t>
-            </a:r>
-            <a:r>
-              <a:rPr lang="en-US" sz="1600" dirty="0" smtClean="0"/>
-              <a:t>drink_type=wine</a:t>
-            </a:r>
-          </a:p>
-          <a:p>
-            <a:r>
-              <a:rPr lang="en-US" sz="1600" dirty="0" smtClean="0"/>
-              <a:t>Source: Google API –Long/</a:t>
-            </a:r>
-            <a:r>
-              <a:rPr lang="en-US" sz="1600" dirty="0" err="1" smtClean="0"/>
-              <a:t>Lat</a:t>
-            </a:r>
-            <a:r>
-              <a:rPr lang="en-US" sz="1600" dirty="0" smtClean="0"/>
-              <a:t> to retrieve zip codes</a:t>
-            </a:r>
-            <a:endParaRPr lang="en-US" sz="1600" dirty="0"/>
+              <a:rPr lang="en-US" dirty="0" smtClean="0"/>
+              <a:t>Australia: 97, 94, 94</a:t>
+            </a:r>
+          </a:p>
+          <a:p>
+            <a:r>
+              <a:rPr lang="en-US" dirty="0" smtClean="0"/>
+              <a:t>Canada: 93, 92.5, 92</a:t>
+            </a:r>
+          </a:p>
+          <a:p>
+            <a:r>
+              <a:rPr lang="en-US" dirty="0" smtClean="0"/>
+              <a:t>France: 98, 97.5, 97</a:t>
+            </a:r>
+          </a:p>
+          <a:p>
+            <a:r>
+              <a:rPr lang="en-US" dirty="0" smtClean="0"/>
+              <a:t>Italy: 95.5, 95, 95</a:t>
+            </a:r>
+          </a:p>
+          <a:p>
+            <a:r>
+              <a:rPr lang="en-US" dirty="0" smtClean="0"/>
+              <a:t>Spain: 95, 94, 94</a:t>
+            </a:r>
+          </a:p>
+          <a:p>
+            <a:r>
+              <a:rPr lang="en-US" dirty="0" smtClean="0"/>
+              <a:t>US: 97, 96, 95</a:t>
+            </a:r>
+          </a:p>
+          <a:p>
+            <a:endParaRPr lang="en-US" dirty="0"/>
+          </a:p>
+          <a:p>
+            <a:r>
+              <a:rPr lang="en-US" dirty="0" smtClean="0"/>
+              <a:t>Top Wineries:</a:t>
+            </a:r>
+          </a:p>
+          <a:p>
+            <a:r>
+              <a:rPr lang="en-US" dirty="0" smtClean="0"/>
+              <a:t>France 98</a:t>
+            </a:r>
+          </a:p>
+          <a:p>
+            <a:r>
+              <a:rPr lang="en-US" dirty="0" smtClean="0"/>
+              <a:t>France 97.5</a:t>
+            </a:r>
+          </a:p>
+          <a:p>
+            <a:r>
+              <a:rPr lang="en-US" dirty="0" smtClean="0"/>
+              <a:t>France/Australia/US 97</a:t>
+            </a:r>
+          </a:p>
+          <a:p>
+            <a:endParaRPr lang="en-US" dirty="0"/>
           </a:p>
         </p:txBody>
       </p:sp>
@@ -6335,6 +6552,13 @@
   <p:clrMapOvr>
     <a:masterClrMapping/>
   </p:clrMapOvr>
+  <p:timing>
+    <p:tnLst>
+      <p:par>
+        <p:cTn id="1" dur="indefinite" restart="never" nodeType="tmRoot"/>
+      </p:par>
+    </p:tnLst>
+  </p:timing>
 </p:sld>
 </file>
 
@@ -6890,6 +7114,13 @@
       <p:transition spd="slow"/>
     </mc:Fallback>
   </mc:AlternateContent>
+  <p:timing>
+    <p:tnLst>
+      <p:par>
+        <p:cTn id="1" dur="indefinite" restart="never" nodeType="tmRoot"/>
+      </p:par>
+    </p:tnLst>
+  </p:timing>
 </p:sld>
 </file>
 
@@ -7027,6 +7258,13 @@
   <p:clrMapOvr>
     <a:masterClrMapping/>
   </p:clrMapOvr>
+  <p:timing>
+    <p:tnLst>
+      <p:par>
+        <p:cTn id="1" dur="indefinite" restart="never" nodeType="tmRoot"/>
+      </p:par>
+    </p:tnLst>
+  </p:timing>
 </p:sld>
 </file>
 
@@ -7187,6 +7425,13 @@
   <p:clrMapOvr>
     <a:masterClrMapping/>
   </p:clrMapOvr>
+  <p:timing>
+    <p:tnLst>
+      <p:par>
+        <p:cTn id="1" dur="indefinite" restart="never" nodeType="tmRoot"/>
+      </p:par>
+    </p:tnLst>
+  </p:timing>
 </p:sld>
 </file>
 

</xml_diff>

<commit_message>
updated changes to wine_data presentation
</commit_message>
<xml_diff>
--- a/Wine_Data.pptx
+++ b/Wine_Data.pptx
@@ -21,11 +21,12 @@
     <p:sldId id="265" r:id="rId15"/>
     <p:sldId id="274" r:id="rId16"/>
     <p:sldId id="275" r:id="rId17"/>
-    <p:sldId id="263" r:id="rId18"/>
-    <p:sldId id="276" r:id="rId19"/>
-    <p:sldId id="264" r:id="rId20"/>
-    <p:sldId id="257" r:id="rId21"/>
-    <p:sldId id="258" r:id="rId22"/>
+    <p:sldId id="277" r:id="rId18"/>
+    <p:sldId id="263" r:id="rId19"/>
+    <p:sldId id="276" r:id="rId20"/>
+    <p:sldId id="264" r:id="rId21"/>
+    <p:sldId id="257" r:id="rId22"/>
+    <p:sldId id="258" r:id="rId23"/>
   </p:sldIdLst>
   <p:sldSz cx="12192000" cy="6858000"/>
   <p:notesSz cx="6858000" cy="9144000"/>
@@ -4534,7 +4535,7 @@
         </p:blipFill>
         <p:spPr>
           <a:xfrm>
-            <a:off x="5812972" y="1396399"/>
+            <a:off x="5786846" y="1329136"/>
             <a:ext cx="6209211" cy="4663976"/>
           </a:xfrm>
           <a:prstGeom prst="rect">
@@ -4779,15 +4780,225 @@
           </a:p>
         </p:txBody>
       </p:sp>
+      <p:sp>
+        <p:nvSpPr>
+          <p:cNvPr id="5" name="TextBox 4"/>
+          <p:cNvSpPr txBox="1"/>
+          <p:nvPr/>
+        </p:nvSpPr>
+        <p:spPr>
+          <a:xfrm>
+            <a:off x="277490" y="6058129"/>
+            <a:ext cx="9349835" cy="861774"/>
+          </a:xfrm>
+          <a:prstGeom prst="rect">
+            <a:avLst/>
+          </a:prstGeom>
+          <a:noFill/>
+        </p:spPr>
+        <p:txBody>
+          <a:bodyPr wrap="square" rtlCol="0">
+            <a:spAutoFit/>
+          </a:bodyPr>
+          <a:lstStyle/>
+          <a:p>
+            <a:r>
+              <a:rPr lang="en-US" sz="1600" dirty="0" smtClean="0"/>
+              <a:t>Source: Pulled 2/23/29 - https</a:t>
+            </a:r>
+            <a:r>
+              <a:rPr lang="en-US" sz="1600" dirty="0"/>
+              <a:t>://</a:t>
+            </a:r>
+            <a:r>
+              <a:rPr lang="en-US" sz="1600" dirty="0" smtClean="0"/>
+              <a:t>www.kaggle.com/zynicide/wine-reviews</a:t>
+            </a:r>
+          </a:p>
+          <a:p>
+            <a:r>
+              <a:rPr lang="en-US" sz="1600" dirty="0" smtClean="0"/>
+              <a:t>Source</a:t>
+            </a:r>
+            <a:r>
+              <a:rPr lang="en-US" sz="1600" dirty="0"/>
+              <a:t>: Scraped June 17, 2017 </a:t>
+            </a:r>
+            <a:r>
+              <a:rPr lang="en-US" sz="1600" dirty="0" smtClean="0"/>
+              <a:t>- https</a:t>
+            </a:r>
+            <a:r>
+              <a:rPr lang="en-US" sz="1600" dirty="0"/>
+              <a:t>://www.winemag.com/?s=&amp;</a:t>
+            </a:r>
+            <a:r>
+              <a:rPr lang="en-US" sz="1600" dirty="0" smtClean="0"/>
+              <a:t>drink_type=wine</a:t>
+            </a:r>
+          </a:p>
+          <a:p>
+            <a:r>
+              <a:rPr lang="en-US" sz="1600" dirty="0" smtClean="0"/>
+              <a:t>Source: Google API –Long/</a:t>
+            </a:r>
+            <a:r>
+              <a:rPr lang="en-US" sz="1600" dirty="0" err="1" smtClean="0"/>
+              <a:t>Lat</a:t>
+            </a:r>
+            <a:r>
+              <a:rPr lang="en-US" sz="1600" dirty="0" smtClean="0"/>
+              <a:t> to retrieve zip codes</a:t>
+            </a:r>
+            <a:endParaRPr lang="en-US" sz="1600" dirty="0"/>
+          </a:p>
+        </p:txBody>
+      </p:sp>
+      <p:sp>
+        <p:nvSpPr>
+          <p:cNvPr id="9" name="TextBox 8"/>
+          <p:cNvSpPr txBox="1"/>
+          <p:nvPr/>
+        </p:nvSpPr>
+        <p:spPr>
+          <a:xfrm>
+            <a:off x="1534696" y="2087811"/>
+            <a:ext cx="5068389" cy="3970318"/>
+          </a:xfrm>
+          <a:prstGeom prst="rect">
+            <a:avLst/>
+          </a:prstGeom>
+          <a:noFill/>
+        </p:spPr>
+        <p:txBody>
+          <a:bodyPr wrap="square" rtlCol="0">
+            <a:spAutoFit/>
+          </a:bodyPr>
+          <a:lstStyle/>
+          <a:p>
+            <a:r>
+              <a:rPr lang="en-US" dirty="0" smtClean="0"/>
+              <a:t>Australia</a:t>
+            </a:r>
+            <a:r>
+              <a:rPr lang="en-US" dirty="0"/>
+              <a:t>: 225, 135, </a:t>
+            </a:r>
+            <a:r>
+              <a:rPr lang="en-US" dirty="0" smtClean="0"/>
+              <a:t>112</a:t>
+            </a:r>
+          </a:p>
+          <a:p>
+            <a:r>
+              <a:rPr lang="en-US" dirty="0"/>
+              <a:t>Canada: 95, 87.5, </a:t>
+            </a:r>
+            <a:r>
+              <a:rPr lang="en-US" dirty="0" smtClean="0"/>
+              <a:t>80</a:t>
+            </a:r>
+          </a:p>
+          <a:p>
+            <a:r>
+              <a:rPr lang="en-US" dirty="0" smtClean="0"/>
+              <a:t>France</a:t>
+            </a:r>
+            <a:r>
+              <a:rPr lang="en-US" dirty="0"/>
+              <a:t>: </a:t>
+            </a:r>
+            <a:r>
+              <a:rPr lang="en-US" dirty="0" smtClean="0"/>
+              <a:t>3300</a:t>
+            </a:r>
+            <a:r>
+              <a:rPr lang="en-US" dirty="0"/>
+              <a:t>, 1562.5, 580</a:t>
+            </a:r>
+          </a:p>
+          <a:p>
+            <a:r>
+              <a:rPr lang="en-US" dirty="0"/>
+              <a:t>Italy: 587, 450, </a:t>
+            </a:r>
+            <a:r>
+              <a:rPr lang="en-US" dirty="0" smtClean="0"/>
+              <a:t>254.5</a:t>
+            </a:r>
+          </a:p>
+          <a:p>
+            <a:r>
+              <a:rPr lang="en-US" dirty="0"/>
+              <a:t>Spain: 160, 130, </a:t>
+            </a:r>
+            <a:r>
+              <a:rPr lang="en-US" dirty="0" smtClean="0"/>
+              <a:t>120</a:t>
+            </a:r>
+            <a:endParaRPr lang="en-US" dirty="0"/>
+          </a:p>
+          <a:p>
+            <a:r>
+              <a:rPr lang="en-US" dirty="0"/>
+              <a:t>US: 387, 275, 250</a:t>
+            </a:r>
+          </a:p>
+          <a:p>
+            <a:endParaRPr lang="en-US" dirty="0" smtClean="0"/>
+          </a:p>
+          <a:p>
+            <a:r>
+              <a:rPr lang="en-US" u="sng" dirty="0" smtClean="0"/>
+              <a:t>Rank:</a:t>
+            </a:r>
+          </a:p>
+          <a:p>
+            <a:r>
+              <a:rPr lang="en-US" dirty="0" smtClean="0"/>
+              <a:t>France</a:t>
+            </a:r>
+          </a:p>
+          <a:p>
+            <a:r>
+              <a:rPr lang="en-US" dirty="0" smtClean="0"/>
+              <a:t>Italy</a:t>
+            </a:r>
+          </a:p>
+          <a:p>
+            <a:r>
+              <a:rPr lang="en-US" dirty="0" smtClean="0"/>
+              <a:t>US</a:t>
+            </a:r>
+          </a:p>
+          <a:p>
+            <a:r>
+              <a:rPr lang="en-US" dirty="0" smtClean="0"/>
+              <a:t>Australia</a:t>
+            </a:r>
+          </a:p>
+          <a:p>
+            <a:r>
+              <a:rPr lang="en-US" dirty="0" smtClean="0"/>
+              <a:t>Spain</a:t>
+            </a:r>
+          </a:p>
+          <a:p>
+            <a:r>
+              <a:rPr lang="en-US" dirty="0" smtClean="0"/>
+              <a:t>Canada</a:t>
+            </a:r>
+            <a:endParaRPr lang="en-US" dirty="0"/>
+          </a:p>
+        </p:txBody>
+      </p:sp>
       <p:pic>
         <p:nvPicPr>
-          <p:cNvPr id="4" name="Content Placeholder 3"/>
+          <p:cNvPr id="10" name="Picture 9"/>
           <p:cNvPicPr>
-            <a:picLocks noGrp="1" noChangeAspect="1"/>
+            <a:picLocks noChangeAspect="1"/>
           </p:cNvPicPr>
-          <p:nvPr>
-            <p:ph idx="4294967295"/>
-          </p:nvPr>
+          <p:nvPr/>
         </p:nvPicPr>
         <p:blipFill>
           <a:blip r:embed="rId2"/>
@@ -4797,218 +5008,14 @@
         </p:blipFill>
         <p:spPr>
           <a:xfrm>
-            <a:off x="6897688" y="1854200"/>
-            <a:ext cx="5294312" cy="4156075"/>
+            <a:off x="5907677" y="1853754"/>
+            <a:ext cx="5652952" cy="4230770"/>
           </a:xfrm>
           <a:prstGeom prst="rect">
             <a:avLst/>
           </a:prstGeom>
         </p:spPr>
       </p:pic>
-      <p:sp>
-        <p:nvSpPr>
-          <p:cNvPr id="5" name="TextBox 4"/>
-          <p:cNvSpPr txBox="1"/>
-          <p:nvPr/>
-        </p:nvSpPr>
-        <p:spPr>
-          <a:xfrm>
-            <a:off x="277490" y="6058129"/>
-            <a:ext cx="9349835" cy="861774"/>
-          </a:xfrm>
-          <a:prstGeom prst="rect">
-            <a:avLst/>
-          </a:prstGeom>
-          <a:noFill/>
-        </p:spPr>
-        <p:txBody>
-          <a:bodyPr wrap="square" rtlCol="0">
-            <a:spAutoFit/>
-          </a:bodyPr>
-          <a:lstStyle/>
-          <a:p>
-            <a:r>
-              <a:rPr lang="en-US" sz="1600" dirty="0" smtClean="0"/>
-              <a:t>Source: Pulled 2/23/29 - https</a:t>
-            </a:r>
-            <a:r>
-              <a:rPr lang="en-US" sz="1600" dirty="0"/>
-              <a:t>://</a:t>
-            </a:r>
-            <a:r>
-              <a:rPr lang="en-US" sz="1600" dirty="0" smtClean="0"/>
-              <a:t>www.kaggle.com/zynicide/wine-reviews</a:t>
-            </a:r>
-          </a:p>
-          <a:p>
-            <a:r>
-              <a:rPr lang="en-US" sz="1600" dirty="0" smtClean="0"/>
-              <a:t>Source</a:t>
-            </a:r>
-            <a:r>
-              <a:rPr lang="en-US" sz="1600" dirty="0"/>
-              <a:t>: Scraped June 17, 2017 </a:t>
-            </a:r>
-            <a:r>
-              <a:rPr lang="en-US" sz="1600" dirty="0" smtClean="0"/>
-              <a:t>- https</a:t>
-            </a:r>
-            <a:r>
-              <a:rPr lang="en-US" sz="1600" dirty="0"/>
-              <a:t>://www.winemag.com/?s=&amp;</a:t>
-            </a:r>
-            <a:r>
-              <a:rPr lang="en-US" sz="1600" dirty="0" smtClean="0"/>
-              <a:t>drink_type=wine</a:t>
-            </a:r>
-          </a:p>
-          <a:p>
-            <a:r>
-              <a:rPr lang="en-US" sz="1600" dirty="0" smtClean="0"/>
-              <a:t>Source: Google API –Long/</a:t>
-            </a:r>
-            <a:r>
-              <a:rPr lang="en-US" sz="1600" dirty="0" err="1" smtClean="0"/>
-              <a:t>Lat</a:t>
-            </a:r>
-            <a:r>
-              <a:rPr lang="en-US" sz="1600" dirty="0" smtClean="0"/>
-              <a:t> to retrieve zip codes</a:t>
-            </a:r>
-            <a:endParaRPr lang="en-US" sz="1600" dirty="0"/>
-          </a:p>
-        </p:txBody>
-      </p:sp>
-      <p:sp>
-        <p:nvSpPr>
-          <p:cNvPr id="9" name="TextBox 8"/>
-          <p:cNvSpPr txBox="1"/>
-          <p:nvPr/>
-        </p:nvSpPr>
-        <p:spPr>
-          <a:xfrm>
-            <a:off x="1534696" y="2087811"/>
-            <a:ext cx="5068389" cy="3970318"/>
-          </a:xfrm>
-          <a:prstGeom prst="rect">
-            <a:avLst/>
-          </a:prstGeom>
-          <a:noFill/>
-        </p:spPr>
-        <p:txBody>
-          <a:bodyPr wrap="square" rtlCol="0">
-            <a:spAutoFit/>
-          </a:bodyPr>
-          <a:lstStyle/>
-          <a:p>
-            <a:r>
-              <a:rPr lang="en-US" dirty="0" smtClean="0"/>
-              <a:t>Australia</a:t>
-            </a:r>
-            <a:r>
-              <a:rPr lang="en-US" dirty="0"/>
-              <a:t>: 225, 135, </a:t>
-            </a:r>
-            <a:r>
-              <a:rPr lang="en-US" dirty="0" smtClean="0"/>
-              <a:t>112</a:t>
-            </a:r>
-          </a:p>
-          <a:p>
-            <a:r>
-              <a:rPr lang="en-US" dirty="0"/>
-              <a:t>Canada: 95, 87.5, </a:t>
-            </a:r>
-            <a:r>
-              <a:rPr lang="en-US" dirty="0" smtClean="0"/>
-              <a:t>80</a:t>
-            </a:r>
-          </a:p>
-          <a:p>
-            <a:r>
-              <a:rPr lang="en-US" dirty="0" smtClean="0"/>
-              <a:t>France</a:t>
-            </a:r>
-            <a:r>
-              <a:rPr lang="en-US" dirty="0"/>
-              <a:t>: 3500, 1562.5, 580</a:t>
-            </a:r>
-          </a:p>
-          <a:p>
-            <a:r>
-              <a:rPr lang="en-US" dirty="0"/>
-              <a:t>Italy: 587, 450, </a:t>
-            </a:r>
-            <a:r>
-              <a:rPr lang="en-US" dirty="0" smtClean="0"/>
-              <a:t>254.5</a:t>
-            </a:r>
-          </a:p>
-          <a:p>
-            <a:r>
-              <a:rPr lang="en-US" dirty="0"/>
-              <a:t>Spain: 160, 130, </a:t>
-            </a:r>
-            <a:r>
-              <a:rPr lang="en-US" dirty="0" smtClean="0"/>
-              <a:t>120</a:t>
-            </a:r>
-            <a:endParaRPr lang="en-US" dirty="0"/>
-          </a:p>
-          <a:p>
-            <a:r>
-              <a:rPr lang="en-US" dirty="0"/>
-              <a:t>US: 387, 275, 250</a:t>
-            </a:r>
-          </a:p>
-          <a:p>
-            <a:endParaRPr lang="en-US" dirty="0" smtClean="0"/>
-          </a:p>
-          <a:p>
-            <a:r>
-              <a:rPr lang="en-US" u="sng" dirty="0" smtClean="0"/>
-              <a:t>Rank:</a:t>
-            </a:r>
-          </a:p>
-          <a:p>
-            <a:r>
-              <a:rPr lang="en-US" dirty="0" smtClean="0"/>
-              <a:t>France</a:t>
-            </a:r>
-          </a:p>
-          <a:p>
-            <a:r>
-              <a:rPr lang="en-US" dirty="0" smtClean="0"/>
-              <a:t>Italy</a:t>
-            </a:r>
-          </a:p>
-          <a:p>
-            <a:r>
-              <a:rPr lang="en-US" dirty="0" smtClean="0"/>
-              <a:t>US</a:t>
-            </a:r>
-          </a:p>
-          <a:p>
-            <a:r>
-              <a:rPr lang="en-US" dirty="0" smtClean="0"/>
-              <a:t>Australia</a:t>
-            </a:r>
-          </a:p>
-          <a:p>
-            <a:r>
-              <a:rPr lang="en-US" dirty="0" smtClean="0"/>
-              <a:t>Spain</a:t>
-            </a:r>
-          </a:p>
-          <a:p>
-            <a:r>
-              <a:rPr lang="en-US" dirty="0" smtClean="0"/>
-              <a:t>Canada</a:t>
-            </a:r>
-            <a:endParaRPr lang="en-US" dirty="0"/>
-          </a:p>
-        </p:txBody>
-      </p:sp>
     </p:spTree>
     <p:extLst>
       <p:ext uri="{BB962C8B-B14F-4D97-AF65-F5344CB8AC3E}">
@@ -5296,127 +5303,46 @@
           <a:p>
             <a:r>
               <a:rPr lang="en-US" dirty="0" smtClean="0"/>
-              <a:t>Roadmap</a:t>
-            </a:r>
-            <a:endParaRPr lang="en-US" dirty="0"/>
-          </a:p>
-        </p:txBody>
-      </p:sp>
-      <p:sp>
-        <p:nvSpPr>
-          <p:cNvPr id="3" name="Content Placeholder 2"/>
-          <p:cNvSpPr>
-            <a:spLocks noGrp="1"/>
-          </p:cNvSpPr>
-          <p:nvPr>
-            <p:ph idx="1"/>
-          </p:nvPr>
-        </p:nvSpPr>
-        <p:spPr>
-          <a:xfrm>
-            <a:off x="1534696" y="2015732"/>
-            <a:ext cx="9520158" cy="3653548"/>
-          </a:xfrm>
-        </p:spPr>
-        <p:txBody>
-          <a:bodyPr>
-            <a:normAutofit lnSpcReduction="10000"/>
-          </a:bodyPr>
-          <a:lstStyle/>
-          <a:p>
-            <a:r>
-              <a:rPr lang="en-US" dirty="0" smtClean="0"/>
-              <a:t>Things we considered </a:t>
-            </a:r>
-            <a:r>
-              <a:rPr lang="en-US" dirty="0" smtClean="0"/>
-              <a:t>but </a:t>
-            </a:r>
-            <a:r>
-              <a:rPr lang="en-US" dirty="0" smtClean="0"/>
-              <a:t>had to </a:t>
-            </a:r>
-            <a:r>
-              <a:rPr lang="en-US" dirty="0" smtClean="0"/>
-              <a:t>table</a:t>
-            </a:r>
-          </a:p>
-          <a:p>
-            <a:endParaRPr lang="en-US" dirty="0" smtClean="0"/>
-          </a:p>
-          <a:p>
-            <a:pPr lvl="1"/>
-            <a:r>
-              <a:rPr lang="en-US" dirty="0" smtClean="0"/>
-              <a:t>A </a:t>
-            </a:r>
-            <a:r>
-              <a:rPr lang="en-US" dirty="0" smtClean="0"/>
-              <a:t>user interface to pop in zip code and give a list of closest wineries</a:t>
-            </a:r>
-          </a:p>
-          <a:p>
-            <a:pPr lvl="1"/>
-            <a:endParaRPr lang="en-US" dirty="0" smtClean="0"/>
-          </a:p>
-          <a:p>
-            <a:pPr lvl="1"/>
-            <a:r>
-              <a:rPr lang="en-US" dirty="0" smtClean="0"/>
-              <a:t>A </a:t>
-            </a:r>
-            <a:r>
-              <a:rPr lang="en-US" dirty="0" smtClean="0"/>
-              <a:t>price forecaster to guess the price of wine futures</a:t>
-            </a:r>
-          </a:p>
-          <a:p>
-            <a:pPr lvl="1"/>
-            <a:endParaRPr lang="en-US" dirty="0" smtClean="0"/>
-          </a:p>
-          <a:p>
-            <a:pPr lvl="1"/>
-            <a:r>
-              <a:rPr lang="en-US" dirty="0" smtClean="0"/>
-              <a:t>An </a:t>
-            </a:r>
-            <a:r>
-              <a:rPr lang="en-US" dirty="0" smtClean="0"/>
-              <a:t>aggregator for wine reviews by </a:t>
-            </a:r>
-            <a:r>
-              <a:rPr lang="en-US" dirty="0" err="1" smtClean="0"/>
-              <a:t>somallier</a:t>
-            </a:r>
-            <a:endParaRPr lang="en-US" dirty="0" smtClean="0"/>
-          </a:p>
-          <a:p>
-            <a:pPr lvl="1"/>
-            <a:endParaRPr lang="en-US" dirty="0" smtClean="0"/>
-          </a:p>
-          <a:p>
-            <a:pPr lvl="1"/>
-            <a:r>
-              <a:rPr lang="en-US" dirty="0" smtClean="0"/>
-              <a:t>Segment </a:t>
-            </a:r>
-            <a:r>
-              <a:rPr lang="en-US" dirty="0" smtClean="0"/>
-              <a:t>wines by standard deviation for Price v. Wine Score </a:t>
-            </a:r>
-          </a:p>
-        </p:txBody>
-      </p:sp>
-      <p:sp>
-        <p:nvSpPr>
-          <p:cNvPr id="7" name="TextBox 6"/>
+              <a:t>Top Ranked wine Varieties</a:t>
+            </a:r>
+            <a:endParaRPr lang="en-US" dirty="0"/>
+          </a:p>
+        </p:txBody>
+      </p:sp>
+      <p:pic>
+        <p:nvPicPr>
+          <p:cNvPr id="4" name="Picture 3"/>
+          <p:cNvPicPr>
+            <a:picLocks noChangeAspect="1"/>
+          </p:cNvPicPr>
+          <p:nvPr/>
+        </p:nvPicPr>
+        <p:blipFill>
+          <a:blip r:embed="rId2"/>
+          <a:stretch>
+            <a:fillRect/>
+          </a:stretch>
+        </p:blipFill>
+        <p:spPr>
+          <a:xfrm>
+            <a:off x="6167302" y="1652822"/>
+            <a:ext cx="5602333" cy="4337857"/>
+          </a:xfrm>
+          <a:prstGeom prst="rect">
+            <a:avLst/>
+          </a:prstGeom>
+        </p:spPr>
+      </p:pic>
+      <p:sp>
+        <p:nvSpPr>
+          <p:cNvPr id="5" name="TextBox 4"/>
           <p:cNvSpPr txBox="1"/>
           <p:nvPr/>
         </p:nvSpPr>
         <p:spPr>
           <a:xfrm>
-            <a:off x="277490" y="6058129"/>
-            <a:ext cx="9349835" cy="861774"/>
+            <a:off x="1226386" y="1998617"/>
+            <a:ext cx="5068389" cy="3693319"/>
           </a:xfrm>
           <a:prstGeom prst="rect">
             <a:avLst/>
@@ -5430,61 +5356,80 @@
           <a:lstStyle/>
           <a:p>
             <a:r>
-              <a:rPr lang="en-US" sz="1600" dirty="0" smtClean="0"/>
-              <a:t>Source: Pulled 2/23/29 - https</a:t>
-            </a:r>
-            <a:r>
-              <a:rPr lang="en-US" sz="1600" dirty="0"/>
-              <a:t>://</a:t>
-            </a:r>
-            <a:r>
-              <a:rPr lang="en-US" sz="1600" dirty="0" smtClean="0"/>
-              <a:t>www.kaggle.com/zynicide/wine-reviews</a:t>
-            </a:r>
-          </a:p>
-          <a:p>
-            <a:r>
-              <a:rPr lang="en-US" sz="1600" dirty="0" smtClean="0"/>
-              <a:t>Source</a:t>
-            </a:r>
-            <a:r>
-              <a:rPr lang="en-US" sz="1600" dirty="0"/>
-              <a:t>: Scraped June 17, 2017 </a:t>
-            </a:r>
-            <a:r>
-              <a:rPr lang="en-US" sz="1600" dirty="0" smtClean="0"/>
-              <a:t>- https</a:t>
-            </a:r>
-            <a:r>
-              <a:rPr lang="en-US" sz="1600" dirty="0"/>
-              <a:t>://www.winemag.com/?s=&amp;</a:t>
-            </a:r>
-            <a:r>
-              <a:rPr lang="en-US" sz="1600" dirty="0" smtClean="0"/>
-              <a:t>drink_type=wine</a:t>
-            </a:r>
-          </a:p>
-          <a:p>
-            <a:r>
-              <a:rPr lang="en-US" sz="1600" dirty="0" smtClean="0"/>
-              <a:t>Source: Google API –Long/</a:t>
-            </a:r>
-            <a:r>
-              <a:rPr lang="en-US" sz="1600" dirty="0" err="1" smtClean="0"/>
-              <a:t>Lat</a:t>
-            </a:r>
-            <a:r>
-              <a:rPr lang="en-US" sz="1600" dirty="0" smtClean="0"/>
-              <a:t> to retrieve zip codes</a:t>
-            </a:r>
-            <a:endParaRPr lang="en-US" sz="1600" dirty="0"/>
+              <a:rPr lang="en-US" dirty="0" smtClean="0"/>
+              <a:t>Australia: 88, 87.5, 89</a:t>
+            </a:r>
+          </a:p>
+          <a:p>
+            <a:r>
+              <a:rPr lang="en-US" dirty="0" smtClean="0"/>
+              <a:t>Canada: </a:t>
+            </a:r>
+            <a:r>
+              <a:rPr lang="en-US" dirty="0"/>
+              <a:t>88, 87.5, </a:t>
+            </a:r>
+            <a:r>
+              <a:rPr lang="en-US" dirty="0" smtClean="0"/>
+              <a:t>89</a:t>
+            </a:r>
+          </a:p>
+          <a:p>
+            <a:r>
+              <a:rPr lang="en-US" dirty="0" smtClean="0"/>
+              <a:t>France: 87, 90, 88</a:t>
+            </a:r>
+          </a:p>
+          <a:p>
+            <a:r>
+              <a:rPr lang="en-US" dirty="0" smtClean="0"/>
+              <a:t>Italy: 92, 88, 87</a:t>
+            </a:r>
+          </a:p>
+          <a:p>
+            <a:r>
+              <a:rPr lang="en-US" dirty="0" smtClean="0"/>
+              <a:t>Spain: 87, 86, 83</a:t>
+            </a:r>
+          </a:p>
+          <a:p>
+            <a:r>
+              <a:rPr lang="en-US" dirty="0" smtClean="0"/>
+              <a:t>US: 88, 89, 83</a:t>
+            </a:r>
+          </a:p>
+          <a:p>
+            <a:endParaRPr lang="en-US" dirty="0"/>
+          </a:p>
+          <a:p>
+            <a:r>
+              <a:rPr lang="en-US" dirty="0" smtClean="0"/>
+              <a:t>Top Varieties are mostly consistent across the top 3 in scores. </a:t>
+            </a:r>
+          </a:p>
+          <a:p>
+            <a:endParaRPr lang="en-US" dirty="0"/>
+          </a:p>
+          <a:p>
+            <a:r>
+              <a:rPr lang="en-US" dirty="0" smtClean="0"/>
+              <a:t>Individual wineries cultivate specialties, not </a:t>
+            </a:r>
+            <a:r>
+              <a:rPr lang="en-US" smtClean="0"/>
+              <a:t>specific countries</a:t>
+            </a:r>
+            <a:endParaRPr lang="en-US" dirty="0" smtClean="0"/>
+          </a:p>
+          <a:p>
+            <a:endParaRPr lang="en-US" dirty="0"/>
           </a:p>
         </p:txBody>
       </p:sp>
     </p:spTree>
     <p:extLst>
       <p:ext uri="{BB962C8B-B14F-4D97-AF65-F5344CB8AC3E}">
-        <p14:creationId xmlns:p14="http://schemas.microsoft.com/office/powerpoint/2010/main" val="1236300385"/>
+        <p14:creationId xmlns:p14="http://schemas.microsoft.com/office/powerpoint/2010/main" val="533132067"/>
       </p:ext>
     </p:extLst>
   </p:cSld>
@@ -5528,6 +5473,238 @@
           <a:p>
             <a:r>
               <a:rPr lang="en-US" dirty="0" smtClean="0"/>
+              <a:t>Roadmap</a:t>
+            </a:r>
+            <a:endParaRPr lang="en-US" dirty="0"/>
+          </a:p>
+        </p:txBody>
+      </p:sp>
+      <p:sp>
+        <p:nvSpPr>
+          <p:cNvPr id="3" name="Content Placeholder 2"/>
+          <p:cNvSpPr>
+            <a:spLocks noGrp="1"/>
+          </p:cNvSpPr>
+          <p:nvPr>
+            <p:ph idx="1"/>
+          </p:nvPr>
+        </p:nvSpPr>
+        <p:spPr>
+          <a:xfrm>
+            <a:off x="1534696" y="2015732"/>
+            <a:ext cx="9520158" cy="3653548"/>
+          </a:xfrm>
+        </p:spPr>
+        <p:txBody>
+          <a:bodyPr>
+            <a:normAutofit lnSpcReduction="10000"/>
+          </a:bodyPr>
+          <a:lstStyle/>
+          <a:p>
+            <a:r>
+              <a:rPr lang="en-US" dirty="0" smtClean="0"/>
+              <a:t>Things we considered </a:t>
+            </a:r>
+            <a:r>
+              <a:rPr lang="en-US" dirty="0" smtClean="0"/>
+              <a:t>but </a:t>
+            </a:r>
+            <a:r>
+              <a:rPr lang="en-US" dirty="0" smtClean="0"/>
+              <a:t>had to </a:t>
+            </a:r>
+            <a:r>
+              <a:rPr lang="en-US" dirty="0" smtClean="0"/>
+              <a:t>table</a:t>
+            </a:r>
+          </a:p>
+          <a:p>
+            <a:endParaRPr lang="en-US" dirty="0" smtClean="0"/>
+          </a:p>
+          <a:p>
+            <a:pPr lvl="1"/>
+            <a:r>
+              <a:rPr lang="en-US" dirty="0" smtClean="0"/>
+              <a:t>A </a:t>
+            </a:r>
+            <a:r>
+              <a:rPr lang="en-US" dirty="0" smtClean="0"/>
+              <a:t>user interface to pop in zip code and give a list of closest wineries</a:t>
+            </a:r>
+          </a:p>
+          <a:p>
+            <a:pPr lvl="1"/>
+            <a:endParaRPr lang="en-US" dirty="0" smtClean="0"/>
+          </a:p>
+          <a:p>
+            <a:pPr lvl="1"/>
+            <a:r>
+              <a:rPr lang="en-US" dirty="0" smtClean="0"/>
+              <a:t>A </a:t>
+            </a:r>
+            <a:r>
+              <a:rPr lang="en-US" dirty="0" smtClean="0"/>
+              <a:t>price forecaster to guess the price of wine futures</a:t>
+            </a:r>
+          </a:p>
+          <a:p>
+            <a:pPr lvl="1"/>
+            <a:endParaRPr lang="en-US" dirty="0" smtClean="0"/>
+          </a:p>
+          <a:p>
+            <a:pPr lvl="1"/>
+            <a:r>
+              <a:rPr lang="en-US" dirty="0" smtClean="0"/>
+              <a:t>An </a:t>
+            </a:r>
+            <a:r>
+              <a:rPr lang="en-US" dirty="0" smtClean="0"/>
+              <a:t>aggregator for wine reviews by </a:t>
+            </a:r>
+            <a:r>
+              <a:rPr lang="en-US" dirty="0" err="1" smtClean="0"/>
+              <a:t>somallier</a:t>
+            </a:r>
+            <a:endParaRPr lang="en-US" dirty="0" smtClean="0"/>
+          </a:p>
+          <a:p>
+            <a:pPr lvl="1"/>
+            <a:endParaRPr lang="en-US" dirty="0" smtClean="0"/>
+          </a:p>
+          <a:p>
+            <a:pPr lvl="1"/>
+            <a:r>
+              <a:rPr lang="en-US" dirty="0" smtClean="0"/>
+              <a:t>Segment </a:t>
+            </a:r>
+            <a:r>
+              <a:rPr lang="en-US" dirty="0" smtClean="0"/>
+              <a:t>wines by standard deviation for Price v. Wine Score </a:t>
+            </a:r>
+          </a:p>
+        </p:txBody>
+      </p:sp>
+      <p:sp>
+        <p:nvSpPr>
+          <p:cNvPr id="7" name="TextBox 6"/>
+          <p:cNvSpPr txBox="1"/>
+          <p:nvPr/>
+        </p:nvSpPr>
+        <p:spPr>
+          <a:xfrm>
+            <a:off x="277490" y="6058129"/>
+            <a:ext cx="9349835" cy="861774"/>
+          </a:xfrm>
+          <a:prstGeom prst="rect">
+            <a:avLst/>
+          </a:prstGeom>
+          <a:noFill/>
+        </p:spPr>
+        <p:txBody>
+          <a:bodyPr wrap="square" rtlCol="0">
+            <a:spAutoFit/>
+          </a:bodyPr>
+          <a:lstStyle/>
+          <a:p>
+            <a:r>
+              <a:rPr lang="en-US" sz="1600" dirty="0" smtClean="0"/>
+              <a:t>Source: Pulled 2/23/29 - https</a:t>
+            </a:r>
+            <a:r>
+              <a:rPr lang="en-US" sz="1600" dirty="0"/>
+              <a:t>://</a:t>
+            </a:r>
+            <a:r>
+              <a:rPr lang="en-US" sz="1600" dirty="0" smtClean="0"/>
+              <a:t>www.kaggle.com/zynicide/wine-reviews</a:t>
+            </a:r>
+          </a:p>
+          <a:p>
+            <a:r>
+              <a:rPr lang="en-US" sz="1600" dirty="0" smtClean="0"/>
+              <a:t>Source</a:t>
+            </a:r>
+            <a:r>
+              <a:rPr lang="en-US" sz="1600" dirty="0"/>
+              <a:t>: Scraped June 17, 2017 </a:t>
+            </a:r>
+            <a:r>
+              <a:rPr lang="en-US" sz="1600" dirty="0" smtClean="0"/>
+              <a:t>- https</a:t>
+            </a:r>
+            <a:r>
+              <a:rPr lang="en-US" sz="1600" dirty="0"/>
+              <a:t>://www.winemag.com/?s=&amp;</a:t>
+            </a:r>
+            <a:r>
+              <a:rPr lang="en-US" sz="1600" dirty="0" smtClean="0"/>
+              <a:t>drink_type=wine</a:t>
+            </a:r>
+          </a:p>
+          <a:p>
+            <a:r>
+              <a:rPr lang="en-US" sz="1600" dirty="0" smtClean="0"/>
+              <a:t>Source: Google API –Long/</a:t>
+            </a:r>
+            <a:r>
+              <a:rPr lang="en-US" sz="1600" dirty="0" err="1" smtClean="0"/>
+              <a:t>Lat</a:t>
+            </a:r>
+            <a:r>
+              <a:rPr lang="en-US" sz="1600" dirty="0" smtClean="0"/>
+              <a:t> to retrieve zip codes</a:t>
+            </a:r>
+            <a:endParaRPr lang="en-US" sz="1600" dirty="0"/>
+          </a:p>
+        </p:txBody>
+      </p:sp>
+    </p:spTree>
+    <p:extLst>
+      <p:ext uri="{BB962C8B-B14F-4D97-AF65-F5344CB8AC3E}">
+        <p14:creationId xmlns:p14="http://schemas.microsoft.com/office/powerpoint/2010/main" val="1236300385"/>
+      </p:ext>
+    </p:extLst>
+  </p:cSld>
+  <p:clrMapOvr>
+    <a:masterClrMapping/>
+  </p:clrMapOvr>
+</p:sld>
+</file>
+
+<file path=ppt/slides/slide19.xml><?xml version="1.0" encoding="utf-8"?>
+<p:sld xmlns:a="http://schemas.openxmlformats.org/drawingml/2006/main" xmlns:r="http://schemas.openxmlformats.org/officeDocument/2006/relationships" xmlns:p="http://schemas.openxmlformats.org/presentationml/2006/main">
+  <p:cSld>
+    <p:spTree>
+      <p:nvGrpSpPr>
+        <p:cNvPr id="1" name=""/>
+        <p:cNvGrpSpPr/>
+        <p:nvPr/>
+      </p:nvGrpSpPr>
+      <p:grpSpPr>
+        <a:xfrm>
+          <a:off x="0" y="0"/>
+          <a:ext cx="0" cy="0"/>
+          <a:chOff x="0" y="0"/>
+          <a:chExt cx="0" cy="0"/>
+        </a:xfrm>
+      </p:grpSpPr>
+      <p:sp>
+        <p:nvSpPr>
+          <p:cNvPr id="2" name="Title 1"/>
+          <p:cNvSpPr>
+            <a:spLocks noGrp="1"/>
+          </p:cNvSpPr>
+          <p:nvPr>
+            <p:ph type="title"/>
+          </p:nvPr>
+        </p:nvSpPr>
+        <p:spPr/>
+        <p:txBody>
+          <a:bodyPr/>
+          <a:lstStyle/>
+          <a:p>
+            <a:r>
+              <a:rPr lang="en-US" dirty="0" smtClean="0"/>
               <a:t>Future Recommendations:</a:t>
             </a:r>
             <a:endParaRPr lang="en-US" dirty="0"/>
@@ -5607,7 +5784,243 @@
 </p:sld>
 </file>
 
-<file path=ppt/slides/slide19.xml><?xml version="1.0" encoding="utf-8"?>
+<file path=ppt/slides/slide2.xml><?xml version="1.0" encoding="utf-8"?>
+<p:sld xmlns:a="http://schemas.openxmlformats.org/drawingml/2006/main" xmlns:r="http://schemas.openxmlformats.org/officeDocument/2006/relationships" xmlns:p="http://schemas.openxmlformats.org/presentationml/2006/main">
+  <p:cSld>
+    <p:spTree>
+      <p:nvGrpSpPr>
+        <p:cNvPr id="1" name=""/>
+        <p:cNvGrpSpPr/>
+        <p:nvPr/>
+      </p:nvGrpSpPr>
+      <p:grpSpPr>
+        <a:xfrm>
+          <a:off x="0" y="0"/>
+          <a:ext cx="0" cy="0"/>
+          <a:chOff x="0" y="0"/>
+          <a:chExt cx="0" cy="0"/>
+        </a:xfrm>
+      </p:grpSpPr>
+      <p:sp>
+        <p:nvSpPr>
+          <p:cNvPr id="2" name="Title 1"/>
+          <p:cNvSpPr>
+            <a:spLocks noGrp="1"/>
+          </p:cNvSpPr>
+          <p:nvPr>
+            <p:ph type="title"/>
+          </p:nvPr>
+        </p:nvSpPr>
+        <p:spPr/>
+        <p:txBody>
+          <a:bodyPr/>
+          <a:lstStyle/>
+          <a:p>
+            <a:r>
+              <a:rPr lang="en-US" dirty="0" smtClean="0"/>
+              <a:t>Approach &amp; Data Sets</a:t>
+            </a:r>
+            <a:endParaRPr lang="en-US" dirty="0"/>
+          </a:p>
+        </p:txBody>
+      </p:sp>
+      <p:sp>
+        <p:nvSpPr>
+          <p:cNvPr id="3" name="Content Placeholder 2"/>
+          <p:cNvSpPr>
+            <a:spLocks noGrp="1"/>
+          </p:cNvSpPr>
+          <p:nvPr>
+            <p:ph idx="1"/>
+          </p:nvPr>
+        </p:nvSpPr>
+        <p:spPr/>
+        <p:txBody>
+          <a:bodyPr>
+            <a:normAutofit/>
+          </a:bodyPr>
+          <a:lstStyle/>
+          <a:p>
+            <a:r>
+              <a:rPr lang="en-US" sz="1800" dirty="0" smtClean="0"/>
+              <a:t>Problem Definition: Find what is the finest wine at an accessible price and location.</a:t>
+            </a:r>
+          </a:p>
+          <a:p>
+            <a:r>
+              <a:rPr lang="en-US" sz="1800" dirty="0" smtClean="0"/>
+              <a:t>Sources Considered: </a:t>
+            </a:r>
+            <a:r>
+              <a:rPr lang="en-US" sz="1800" dirty="0" err="1" smtClean="0"/>
+              <a:t>Kaggle</a:t>
+            </a:r>
+            <a:r>
+              <a:rPr lang="en-US" sz="1800" dirty="0" smtClean="0"/>
+              <a:t>, Weather </a:t>
+            </a:r>
+            <a:r>
+              <a:rPr lang="en-US" sz="1800" dirty="0" smtClean="0"/>
+              <a:t>Data &amp; Census </a:t>
+            </a:r>
+            <a:r>
+              <a:rPr lang="en-US" sz="1800" dirty="0" smtClean="0"/>
+              <a:t>Data</a:t>
+            </a:r>
+            <a:endParaRPr lang="en-US" sz="1800" dirty="0" smtClean="0"/>
+          </a:p>
+          <a:p>
+            <a:r>
+              <a:rPr lang="en-US" sz="1800" dirty="0" smtClean="0"/>
+              <a:t>Data Sources acquired and used: </a:t>
+            </a:r>
+            <a:r>
+              <a:rPr lang="en-US" sz="1800" dirty="0" err="1" smtClean="0"/>
+              <a:t>Kaggle</a:t>
+            </a:r>
+            <a:r>
+              <a:rPr lang="en-US" sz="1800" dirty="0" smtClean="0"/>
+              <a:t>, Wine </a:t>
+            </a:r>
+            <a:r>
+              <a:rPr lang="en-US" sz="1800" dirty="0" smtClean="0"/>
+              <a:t>Mag Data &amp; Google API</a:t>
+            </a:r>
+          </a:p>
+          <a:p>
+            <a:r>
+              <a:rPr lang="en-US" sz="1800" dirty="0" smtClean="0"/>
+              <a:t>Analysis Considered:</a:t>
+            </a:r>
+          </a:p>
+          <a:p>
+            <a:pPr lvl="1"/>
+            <a:r>
+              <a:rPr lang="en-US" sz="1600" dirty="0" smtClean="0"/>
+              <a:t>Wine Price v. Income Data</a:t>
+            </a:r>
+          </a:p>
+          <a:p>
+            <a:pPr lvl="1"/>
+            <a:r>
+              <a:rPr lang="en-US" sz="1600" dirty="0" smtClean="0"/>
+              <a:t>Wine Score v. Weather Data</a:t>
+            </a:r>
+            <a:endParaRPr lang="en-US" sz="1600" dirty="0"/>
+          </a:p>
+        </p:txBody>
+      </p:sp>
+      <p:sp>
+        <p:nvSpPr>
+          <p:cNvPr id="4" name="TextBox 3"/>
+          <p:cNvSpPr txBox="1"/>
+          <p:nvPr/>
+        </p:nvSpPr>
+        <p:spPr>
+          <a:xfrm>
+            <a:off x="6074228" y="4489550"/>
+            <a:ext cx="5969726" cy="1138773"/>
+          </a:xfrm>
+          <a:prstGeom prst="rect">
+            <a:avLst/>
+          </a:prstGeom>
+          <a:noFill/>
+        </p:spPr>
+        <p:txBody>
+          <a:bodyPr wrap="square" rtlCol="0">
+            <a:spAutoFit/>
+          </a:bodyPr>
+          <a:lstStyle/>
+          <a:p>
+            <a:r>
+              <a:rPr lang="en-US" sz="1400" dirty="0" smtClean="0"/>
+              <a:t>Weather data </a:t>
+            </a:r>
+            <a:r>
+              <a:rPr lang="en-US" sz="1100" dirty="0" smtClean="0"/>
+              <a:t>Harvest Timing </a:t>
+            </a:r>
+            <a:r>
+              <a:rPr lang="en-US" dirty="0" smtClean="0"/>
+              <a:t>Census Data </a:t>
+            </a:r>
+            <a:r>
+              <a:rPr lang="en-US" sz="2000" dirty="0" smtClean="0"/>
+              <a:t>Income </a:t>
+            </a:r>
+            <a:r>
+              <a:rPr lang="en-US" sz="1600" dirty="0" smtClean="0"/>
+              <a:t>Affluence </a:t>
+            </a:r>
+            <a:r>
+              <a:rPr lang="en-US" dirty="0" smtClean="0"/>
+              <a:t>Google Maps </a:t>
+            </a:r>
+            <a:r>
+              <a:rPr lang="en-US" sz="2400" dirty="0" smtClean="0">
+                <a:solidFill>
+                  <a:schemeClr val="accent4"/>
+                </a:solidFill>
+              </a:rPr>
+              <a:t>Wine Score </a:t>
+            </a:r>
+            <a:r>
+              <a:rPr lang="en-US" dirty="0" smtClean="0"/>
+              <a:t>130k rows </a:t>
+            </a:r>
+            <a:r>
+              <a:rPr lang="en-US" sz="2000" dirty="0" smtClean="0"/>
+              <a:t>Region </a:t>
+            </a:r>
+            <a:r>
+              <a:rPr lang="en-US" sz="1400" dirty="0" smtClean="0"/>
+              <a:t>Zip Code</a:t>
+            </a:r>
+            <a:endParaRPr lang="en-US" sz="1600" dirty="0" smtClean="0"/>
+          </a:p>
+          <a:p>
+            <a:r>
+              <a:rPr lang="en-US" sz="2400" b="1" dirty="0" smtClean="0"/>
+              <a:t>Price</a:t>
+            </a:r>
+            <a:r>
+              <a:rPr lang="en-US" sz="2400" dirty="0" smtClean="0"/>
+              <a:t> </a:t>
+            </a:r>
+            <a:r>
+              <a:rPr lang="en-US" sz="1600" dirty="0" smtClean="0"/>
+              <a:t>Country</a:t>
+            </a:r>
+            <a:r>
+              <a:rPr lang="en-US" dirty="0" smtClean="0"/>
+              <a:t> Province Napa Valley </a:t>
+            </a:r>
+            <a:r>
+              <a:rPr lang="en-US" sz="1400" dirty="0" smtClean="0"/>
+              <a:t>Quality </a:t>
+            </a:r>
+            <a:r>
+              <a:rPr lang="en-US" sz="1100" dirty="0" smtClean="0"/>
+              <a:t>Standard Deviation</a:t>
+            </a:r>
+            <a:endParaRPr lang="en-US" sz="1100" dirty="0"/>
+          </a:p>
+        </p:txBody>
+      </p:sp>
+    </p:spTree>
+    <p:extLst>
+      <p:ext uri="{BB962C8B-B14F-4D97-AF65-F5344CB8AC3E}">
+        <p14:creationId xmlns:p14="http://schemas.microsoft.com/office/powerpoint/2010/main" val="3414568265"/>
+      </p:ext>
+    </p:extLst>
+  </p:cSld>
+  <p:clrMapOvr>
+    <a:masterClrMapping/>
+  </p:clrMapOvr>
+</p:sld>
+</file>
+
+<file path=ppt/slides/slide20.xml><?xml version="1.0" encoding="utf-8"?>
 <p:sld xmlns:a="http://schemas.openxmlformats.org/drawingml/2006/main" xmlns:r="http://schemas.openxmlformats.org/officeDocument/2006/relationships" xmlns:p="http://schemas.openxmlformats.org/presentationml/2006/main">
   <p:cSld>
     <p:spTree>
@@ -5660,243 +6073,7 @@
 </p:sld>
 </file>
 
-<file path=ppt/slides/slide2.xml><?xml version="1.0" encoding="utf-8"?>
-<p:sld xmlns:a="http://schemas.openxmlformats.org/drawingml/2006/main" xmlns:r="http://schemas.openxmlformats.org/officeDocument/2006/relationships" xmlns:p="http://schemas.openxmlformats.org/presentationml/2006/main">
-  <p:cSld>
-    <p:spTree>
-      <p:nvGrpSpPr>
-        <p:cNvPr id="1" name=""/>
-        <p:cNvGrpSpPr/>
-        <p:nvPr/>
-      </p:nvGrpSpPr>
-      <p:grpSpPr>
-        <a:xfrm>
-          <a:off x="0" y="0"/>
-          <a:ext cx="0" cy="0"/>
-          <a:chOff x="0" y="0"/>
-          <a:chExt cx="0" cy="0"/>
-        </a:xfrm>
-      </p:grpSpPr>
-      <p:sp>
-        <p:nvSpPr>
-          <p:cNvPr id="2" name="Title 1"/>
-          <p:cNvSpPr>
-            <a:spLocks noGrp="1"/>
-          </p:cNvSpPr>
-          <p:nvPr>
-            <p:ph type="title"/>
-          </p:nvPr>
-        </p:nvSpPr>
-        <p:spPr/>
-        <p:txBody>
-          <a:bodyPr/>
-          <a:lstStyle/>
-          <a:p>
-            <a:r>
-              <a:rPr lang="en-US" dirty="0" smtClean="0"/>
-              <a:t>Approach &amp; Data Sets</a:t>
-            </a:r>
-            <a:endParaRPr lang="en-US" dirty="0"/>
-          </a:p>
-        </p:txBody>
-      </p:sp>
-      <p:sp>
-        <p:nvSpPr>
-          <p:cNvPr id="3" name="Content Placeholder 2"/>
-          <p:cNvSpPr>
-            <a:spLocks noGrp="1"/>
-          </p:cNvSpPr>
-          <p:nvPr>
-            <p:ph idx="1"/>
-          </p:nvPr>
-        </p:nvSpPr>
-        <p:spPr/>
-        <p:txBody>
-          <a:bodyPr>
-            <a:normAutofit/>
-          </a:bodyPr>
-          <a:lstStyle/>
-          <a:p>
-            <a:r>
-              <a:rPr lang="en-US" sz="1800" dirty="0" smtClean="0"/>
-              <a:t>Problem Definition: Find what is the finest wine at an accessible price and location.</a:t>
-            </a:r>
-          </a:p>
-          <a:p>
-            <a:r>
-              <a:rPr lang="en-US" sz="1800" dirty="0" smtClean="0"/>
-              <a:t>Sources Considered: </a:t>
-            </a:r>
-            <a:r>
-              <a:rPr lang="en-US" sz="1800" dirty="0" err="1" smtClean="0"/>
-              <a:t>Kaggle</a:t>
-            </a:r>
-            <a:r>
-              <a:rPr lang="en-US" sz="1800" dirty="0" smtClean="0"/>
-              <a:t>, Weather </a:t>
-            </a:r>
-            <a:r>
-              <a:rPr lang="en-US" sz="1800" dirty="0" smtClean="0"/>
-              <a:t>Data &amp; Census </a:t>
-            </a:r>
-            <a:r>
-              <a:rPr lang="en-US" sz="1800" dirty="0" smtClean="0"/>
-              <a:t>Data</a:t>
-            </a:r>
-            <a:endParaRPr lang="en-US" sz="1800" dirty="0" smtClean="0"/>
-          </a:p>
-          <a:p>
-            <a:r>
-              <a:rPr lang="en-US" sz="1800" dirty="0" smtClean="0"/>
-              <a:t>Data Sources acquired and used: </a:t>
-            </a:r>
-            <a:r>
-              <a:rPr lang="en-US" sz="1800" dirty="0" err="1" smtClean="0"/>
-              <a:t>Kaggle</a:t>
-            </a:r>
-            <a:r>
-              <a:rPr lang="en-US" sz="1800" dirty="0" smtClean="0"/>
-              <a:t>, Wine </a:t>
-            </a:r>
-            <a:r>
-              <a:rPr lang="en-US" sz="1800" dirty="0" smtClean="0"/>
-              <a:t>Mag Data &amp; Google API</a:t>
-            </a:r>
-          </a:p>
-          <a:p>
-            <a:r>
-              <a:rPr lang="en-US" sz="1800" dirty="0" smtClean="0"/>
-              <a:t>Analysis Considered:</a:t>
-            </a:r>
-          </a:p>
-          <a:p>
-            <a:pPr lvl="1"/>
-            <a:r>
-              <a:rPr lang="en-US" sz="1600" dirty="0" smtClean="0"/>
-              <a:t>Wine Price v. Income Data</a:t>
-            </a:r>
-          </a:p>
-          <a:p>
-            <a:pPr lvl="1"/>
-            <a:r>
-              <a:rPr lang="en-US" sz="1600" dirty="0" smtClean="0"/>
-              <a:t>Wine Score v. Weather Data</a:t>
-            </a:r>
-            <a:endParaRPr lang="en-US" sz="1600" dirty="0"/>
-          </a:p>
-        </p:txBody>
-      </p:sp>
-      <p:sp>
-        <p:nvSpPr>
-          <p:cNvPr id="4" name="TextBox 3"/>
-          <p:cNvSpPr txBox="1"/>
-          <p:nvPr/>
-        </p:nvSpPr>
-        <p:spPr>
-          <a:xfrm>
-            <a:off x="6074228" y="4489550"/>
-            <a:ext cx="5969726" cy="1138773"/>
-          </a:xfrm>
-          <a:prstGeom prst="rect">
-            <a:avLst/>
-          </a:prstGeom>
-          <a:noFill/>
-        </p:spPr>
-        <p:txBody>
-          <a:bodyPr wrap="square" rtlCol="0">
-            <a:spAutoFit/>
-          </a:bodyPr>
-          <a:lstStyle/>
-          <a:p>
-            <a:r>
-              <a:rPr lang="en-US" sz="1400" dirty="0" smtClean="0"/>
-              <a:t>Weather data </a:t>
-            </a:r>
-            <a:r>
-              <a:rPr lang="en-US" sz="1100" dirty="0" smtClean="0"/>
-              <a:t>Harvest Timing </a:t>
-            </a:r>
-            <a:r>
-              <a:rPr lang="en-US" dirty="0" smtClean="0"/>
-              <a:t>Census Data </a:t>
-            </a:r>
-            <a:r>
-              <a:rPr lang="en-US" sz="2000" dirty="0" smtClean="0"/>
-              <a:t>Income </a:t>
-            </a:r>
-            <a:r>
-              <a:rPr lang="en-US" sz="1600" dirty="0" smtClean="0"/>
-              <a:t>Affluence </a:t>
-            </a:r>
-            <a:r>
-              <a:rPr lang="en-US" dirty="0" smtClean="0"/>
-              <a:t>Google Maps </a:t>
-            </a:r>
-            <a:r>
-              <a:rPr lang="en-US" sz="2400" dirty="0" smtClean="0">
-                <a:solidFill>
-                  <a:schemeClr val="accent4"/>
-                </a:solidFill>
-              </a:rPr>
-              <a:t>Wine Score </a:t>
-            </a:r>
-            <a:r>
-              <a:rPr lang="en-US" dirty="0" smtClean="0"/>
-              <a:t>130k rows </a:t>
-            </a:r>
-            <a:r>
-              <a:rPr lang="en-US" sz="2000" dirty="0" smtClean="0"/>
-              <a:t>Region </a:t>
-            </a:r>
-            <a:r>
-              <a:rPr lang="en-US" sz="1400" dirty="0" smtClean="0"/>
-              <a:t>Zip Code</a:t>
-            </a:r>
-            <a:endParaRPr lang="en-US" sz="1600" dirty="0" smtClean="0"/>
-          </a:p>
-          <a:p>
-            <a:r>
-              <a:rPr lang="en-US" sz="2400" b="1" dirty="0" smtClean="0"/>
-              <a:t>Price</a:t>
-            </a:r>
-            <a:r>
-              <a:rPr lang="en-US" sz="2400" dirty="0" smtClean="0"/>
-              <a:t> </a:t>
-            </a:r>
-            <a:r>
-              <a:rPr lang="en-US" sz="1600" dirty="0" smtClean="0"/>
-              <a:t>Country</a:t>
-            </a:r>
-            <a:r>
-              <a:rPr lang="en-US" dirty="0" smtClean="0"/>
-              <a:t> Province Napa Valley </a:t>
-            </a:r>
-            <a:r>
-              <a:rPr lang="en-US" sz="1400" dirty="0" smtClean="0"/>
-              <a:t>Quality </a:t>
-            </a:r>
-            <a:r>
-              <a:rPr lang="en-US" sz="1100" dirty="0" smtClean="0"/>
-              <a:t>Standard Deviation</a:t>
-            </a:r>
-            <a:endParaRPr lang="en-US" sz="1100" dirty="0"/>
-          </a:p>
-        </p:txBody>
-      </p:sp>
-    </p:spTree>
-    <p:extLst>
-      <p:ext uri="{BB962C8B-B14F-4D97-AF65-F5344CB8AC3E}">
-        <p14:creationId xmlns:p14="http://schemas.microsoft.com/office/powerpoint/2010/main" val="3414568265"/>
-      </p:ext>
-    </p:extLst>
-  </p:cSld>
-  <p:clrMapOvr>
-    <a:masterClrMapping/>
-  </p:clrMapOvr>
-</p:sld>
-</file>
-
-<file path=ppt/slides/slide20.xml><?xml version="1.0" encoding="utf-8"?>
+<file path=ppt/slides/slide21.xml><?xml version="1.0" encoding="utf-8"?>
 <p:sld xmlns:a="http://schemas.openxmlformats.org/drawingml/2006/main" xmlns:r="http://schemas.openxmlformats.org/officeDocument/2006/relationships" xmlns:p="http://schemas.openxmlformats.org/presentationml/2006/main" show="0">
   <p:cSld>
     <p:spTree>
@@ -6263,7 +6440,7 @@
 </p:sld>
 </file>
 
-<file path=ppt/slides/slide21.xml><?xml version="1.0" encoding="utf-8"?>
+<file path=ppt/slides/slide22.xml><?xml version="1.0" encoding="utf-8"?>
 <p:sld xmlns:a="http://schemas.openxmlformats.org/drawingml/2006/main" xmlns:r="http://schemas.openxmlformats.org/officeDocument/2006/relationships" xmlns:p="http://schemas.openxmlformats.org/presentationml/2006/main" show="0">
   <p:cSld>
     <p:spTree>

</xml_diff>